<commit_message>
Change Abschlussfeier in Meilensteinplan
</commit_message>
<xml_diff>
--- a/Projekthandbuch/Planungsdokumente/Phasen- und Meilensteinplan.pptx
+++ b/Projekthandbuch/Planungsdokumente/Phasen- und Meilensteinplan.pptx
@@ -259,7 +259,7 @@
           <a:p>
             <a:fld id="{68E54768-666B-7949-B767-B7A5EBFD46D1}" type="datetimeFigureOut">
               <a:rPr lang="de-DE" smtClean="0"/>
-              <a:t>28.05.24</a:t>
+              <a:t>29.05.24</a:t>
             </a:fld>
             <a:endParaRPr lang="de-DE"/>
           </a:p>
@@ -432,7 +432,7 @@
           <a:p>
             <a:fld id="{68E54768-666B-7949-B767-B7A5EBFD46D1}" type="datetimeFigureOut">
               <a:rPr lang="de-DE" smtClean="0"/>
-              <a:t>28.05.24</a:t>
+              <a:t>29.05.24</a:t>
             </a:fld>
             <a:endParaRPr lang="de-DE"/>
           </a:p>
@@ -615,7 +615,7 @@
           <a:p>
             <a:fld id="{68E54768-666B-7949-B767-B7A5EBFD46D1}" type="datetimeFigureOut">
               <a:rPr lang="de-DE" smtClean="0"/>
-              <a:t>28.05.24</a:t>
+              <a:t>29.05.24</a:t>
             </a:fld>
             <a:endParaRPr lang="de-DE"/>
           </a:p>
@@ -788,7 +788,7 @@
           <a:p>
             <a:fld id="{68E54768-666B-7949-B767-B7A5EBFD46D1}" type="datetimeFigureOut">
               <a:rPr lang="de-DE" smtClean="0"/>
-              <a:t>28.05.24</a:t>
+              <a:t>29.05.24</a:t>
             </a:fld>
             <a:endParaRPr lang="de-DE"/>
           </a:p>
@@ -1066,7 +1066,7 @@
           <a:p>
             <a:fld id="{68E54768-666B-7949-B767-B7A5EBFD46D1}" type="datetimeFigureOut">
               <a:rPr lang="de-DE" smtClean="0"/>
-              <a:t>28.05.24</a:t>
+              <a:t>29.05.24</a:t>
             </a:fld>
             <a:endParaRPr lang="de-DE"/>
           </a:p>
@@ -1281,7 +1281,7 @@
           <a:p>
             <a:fld id="{68E54768-666B-7949-B767-B7A5EBFD46D1}" type="datetimeFigureOut">
               <a:rPr lang="de-DE" smtClean="0"/>
-              <a:t>28.05.24</a:t>
+              <a:t>29.05.24</a:t>
             </a:fld>
             <a:endParaRPr lang="de-DE"/>
           </a:p>
@@ -1649,7 +1649,7 @@
           <a:p>
             <a:fld id="{68E54768-666B-7949-B767-B7A5EBFD46D1}" type="datetimeFigureOut">
               <a:rPr lang="de-DE" smtClean="0"/>
-              <a:t>28.05.24</a:t>
+              <a:t>29.05.24</a:t>
             </a:fld>
             <a:endParaRPr lang="de-DE"/>
           </a:p>
@@ -1790,7 +1790,7 @@
           <a:p>
             <a:fld id="{68E54768-666B-7949-B767-B7A5EBFD46D1}" type="datetimeFigureOut">
               <a:rPr lang="de-DE" smtClean="0"/>
-              <a:t>28.05.24</a:t>
+              <a:t>29.05.24</a:t>
             </a:fld>
             <a:endParaRPr lang="de-DE"/>
           </a:p>
@@ -1903,7 +1903,7 @@
           <a:p>
             <a:fld id="{68E54768-666B-7949-B767-B7A5EBFD46D1}" type="datetimeFigureOut">
               <a:rPr lang="de-DE" smtClean="0"/>
-              <a:t>28.05.24</a:t>
+              <a:t>29.05.24</a:t>
             </a:fld>
             <a:endParaRPr lang="de-DE"/>
           </a:p>
@@ -2192,7 +2192,7 @@
           <a:p>
             <a:fld id="{68E54768-666B-7949-B767-B7A5EBFD46D1}" type="datetimeFigureOut">
               <a:rPr lang="de-DE" smtClean="0"/>
-              <a:t>28.05.24</a:t>
+              <a:t>29.05.24</a:t>
             </a:fld>
             <a:endParaRPr lang="de-DE"/>
           </a:p>
@@ -2483,7 +2483,7 @@
           <a:p>
             <a:fld id="{68E54768-666B-7949-B767-B7A5EBFD46D1}" type="datetimeFigureOut">
               <a:rPr lang="de-DE" smtClean="0"/>
-              <a:t>28.05.24</a:t>
+              <a:t>29.05.24</a:t>
             </a:fld>
             <a:endParaRPr lang="de-DE"/>
           </a:p>
@@ -2699,7 +2699,7 @@
           <a:p>
             <a:fld id="{68E54768-666B-7949-B767-B7A5EBFD46D1}" type="datetimeFigureOut">
               <a:rPr lang="de-DE" smtClean="0"/>
-              <a:t>28.05.24</a:t>
+              <a:t>29.05.24</a:t>
             </a:fld>
             <a:endParaRPr lang="de-DE"/>
           </a:p>
@@ -4770,8 +4770,8 @@
         </p:nvSpPr>
         <p:spPr>
           <a:xfrm>
-            <a:off x="10700674" y="5180320"/>
-            <a:ext cx="1617473" cy="754053"/>
+            <a:off x="10679816" y="5180320"/>
+            <a:ext cx="1638331" cy="754053"/>
           </a:xfrm>
           <a:prstGeom prst="rect">
             <a:avLst/>
@@ -4787,21 +4787,14 @@
             <a:pPr algn="ctr"/>
             <a:r>
               <a:rPr lang="de-DE" sz="1600" dirty="0"/>
-              <a:t>Projektabschluss + Feiern </a:t>
-            </a:r>
-            <a:r>
-              <a:rPr lang="de-DE" sz="1600" dirty="0">
-                <a:sym typeface="Wingdings" pitchFamily="2" charset="2"/>
-              </a:rPr>
-              <a:t></a:t>
-            </a:r>
-            <a:endParaRPr lang="de-DE" dirty="0"/>
-          </a:p>
-          <a:p>
-            <a:pPr algn="ctr"/>
+              <a:t>Projektabschluss-feier </a:t>
+            </a:r>
+            <a:br>
+              <a:rPr lang="de-DE" sz="1600" dirty="0"/>
+            </a:br>
             <a:r>
               <a:rPr lang="de-DE" sz="1100" dirty="0"/>
-              <a:t>(26.07.)</a:t>
+              <a:t> (26.07.)</a:t>
             </a:r>
           </a:p>
         </p:txBody>

</xml_diff>

<commit_message>
Add several new Projektmanagment-Documents
</commit_message>
<xml_diff>
--- a/Projekthandbuch/Planungsdokumente/Phasen- und Meilensteinplan.pptx
+++ b/Projekthandbuch/Planungsdokumente/Phasen- und Meilensteinplan.pptx
@@ -259,7 +259,7 @@
           <a:p>
             <a:fld id="{68E54768-666B-7949-B767-B7A5EBFD46D1}" type="datetimeFigureOut">
               <a:rPr lang="de-DE" smtClean="0"/>
-              <a:t>26.06.24</a:t>
+              <a:t>04.07.24</a:t>
             </a:fld>
             <a:endParaRPr lang="de-DE"/>
           </a:p>
@@ -432,7 +432,7 @@
           <a:p>
             <a:fld id="{68E54768-666B-7949-B767-B7A5EBFD46D1}" type="datetimeFigureOut">
               <a:rPr lang="de-DE" smtClean="0"/>
-              <a:t>26.06.24</a:t>
+              <a:t>04.07.24</a:t>
             </a:fld>
             <a:endParaRPr lang="de-DE"/>
           </a:p>
@@ -615,7 +615,7 @@
           <a:p>
             <a:fld id="{68E54768-666B-7949-B767-B7A5EBFD46D1}" type="datetimeFigureOut">
               <a:rPr lang="de-DE" smtClean="0"/>
-              <a:t>26.06.24</a:t>
+              <a:t>04.07.24</a:t>
             </a:fld>
             <a:endParaRPr lang="de-DE"/>
           </a:p>
@@ -788,7 +788,7 @@
           <a:p>
             <a:fld id="{68E54768-666B-7949-B767-B7A5EBFD46D1}" type="datetimeFigureOut">
               <a:rPr lang="de-DE" smtClean="0"/>
-              <a:t>26.06.24</a:t>
+              <a:t>04.07.24</a:t>
             </a:fld>
             <a:endParaRPr lang="de-DE"/>
           </a:p>
@@ -1066,7 +1066,7 @@
           <a:p>
             <a:fld id="{68E54768-666B-7949-B767-B7A5EBFD46D1}" type="datetimeFigureOut">
               <a:rPr lang="de-DE" smtClean="0"/>
-              <a:t>26.06.24</a:t>
+              <a:t>04.07.24</a:t>
             </a:fld>
             <a:endParaRPr lang="de-DE"/>
           </a:p>
@@ -1281,7 +1281,7 @@
           <a:p>
             <a:fld id="{68E54768-666B-7949-B767-B7A5EBFD46D1}" type="datetimeFigureOut">
               <a:rPr lang="de-DE" smtClean="0"/>
-              <a:t>26.06.24</a:t>
+              <a:t>04.07.24</a:t>
             </a:fld>
             <a:endParaRPr lang="de-DE"/>
           </a:p>
@@ -1649,7 +1649,7 @@
           <a:p>
             <a:fld id="{68E54768-666B-7949-B767-B7A5EBFD46D1}" type="datetimeFigureOut">
               <a:rPr lang="de-DE" smtClean="0"/>
-              <a:t>26.06.24</a:t>
+              <a:t>04.07.24</a:t>
             </a:fld>
             <a:endParaRPr lang="de-DE"/>
           </a:p>
@@ -1790,7 +1790,7 @@
           <a:p>
             <a:fld id="{68E54768-666B-7949-B767-B7A5EBFD46D1}" type="datetimeFigureOut">
               <a:rPr lang="de-DE" smtClean="0"/>
-              <a:t>26.06.24</a:t>
+              <a:t>04.07.24</a:t>
             </a:fld>
             <a:endParaRPr lang="de-DE"/>
           </a:p>
@@ -1903,7 +1903,7 @@
           <a:p>
             <a:fld id="{68E54768-666B-7949-B767-B7A5EBFD46D1}" type="datetimeFigureOut">
               <a:rPr lang="de-DE" smtClean="0"/>
-              <a:t>26.06.24</a:t>
+              <a:t>04.07.24</a:t>
             </a:fld>
             <a:endParaRPr lang="de-DE"/>
           </a:p>
@@ -2192,7 +2192,7 @@
           <a:p>
             <a:fld id="{68E54768-666B-7949-B767-B7A5EBFD46D1}" type="datetimeFigureOut">
               <a:rPr lang="de-DE" smtClean="0"/>
-              <a:t>26.06.24</a:t>
+              <a:t>04.07.24</a:t>
             </a:fld>
             <a:endParaRPr lang="de-DE"/>
           </a:p>
@@ -2483,7 +2483,7 @@
           <a:p>
             <a:fld id="{68E54768-666B-7949-B767-B7A5EBFD46D1}" type="datetimeFigureOut">
               <a:rPr lang="de-DE" smtClean="0"/>
-              <a:t>26.06.24</a:t>
+              <a:t>04.07.24</a:t>
             </a:fld>
             <a:endParaRPr lang="de-DE"/>
           </a:p>
@@ -2699,7 +2699,7 @@
           <a:p>
             <a:fld id="{68E54768-666B-7949-B767-B7A5EBFD46D1}" type="datetimeFigureOut">
               <a:rPr lang="de-DE" smtClean="0"/>
-              <a:t>26.06.24</a:t>
+              <a:t>04.07.24</a:t>
             </a:fld>
             <a:endParaRPr lang="de-DE"/>
           </a:p>
@@ -3868,7 +3868,7 @@
             <a:pPr algn="ctr"/>
             <a:r>
               <a:rPr lang="de-DE" sz="1400" dirty="0"/>
-              <a:t>Projekthandbuch</a:t>
+              <a:t>Beginn Projekthandbuch</a:t>
             </a:r>
           </a:p>
         </p:txBody>
@@ -4248,8 +4248,8 @@
         </p:nvSpPr>
         <p:spPr>
           <a:xfrm>
-            <a:off x="8837866" y="3533488"/>
-            <a:ext cx="1769896" cy="815608"/>
+            <a:off x="8837866" y="3566738"/>
+            <a:ext cx="1769896" cy="754053"/>
           </a:xfrm>
           <a:prstGeom prst="rect">
             <a:avLst/>
@@ -4263,7 +4263,7 @@
           <a:lstStyle/>
           <a:p>
             <a:r>
-              <a:rPr lang="de-DE" dirty="0"/>
+              <a:rPr lang="de-DE" sz="1600" dirty="0"/>
               <a:t>Fertigstellung des Projekts</a:t>
             </a:r>
           </a:p>

</xml_diff>

<commit_message>
Second iteration final draft
</commit_message>
<xml_diff>
--- a/Projekthandbuch/Planungsdokumente/Phasen- und Meilensteinplan.pptx
+++ b/Projekthandbuch/Planungsdokumente/Phasen- und Meilensteinplan.pptx
@@ -6,6 +6,7 @@
   </p:sldMasterIdLst>
   <p:sldIdLst>
     <p:sldId id="256" r:id="rId2"/>
+    <p:sldId id="257" r:id="rId3"/>
   </p:sldIdLst>
   <p:sldSz cx="12192000" cy="6858000"/>
   <p:notesSz cx="6858000" cy="9144000"/>
@@ -259,7 +260,7 @@
           <a:p>
             <a:fld id="{68E54768-666B-7949-B767-B7A5EBFD46D1}" type="datetimeFigureOut">
               <a:rPr lang="de-DE" smtClean="0"/>
-              <a:t>16.07.24</a:t>
+              <a:t>18.07.24</a:t>
             </a:fld>
             <a:endParaRPr lang="de-DE"/>
           </a:p>
@@ -432,7 +433,7 @@
           <a:p>
             <a:fld id="{68E54768-666B-7949-B767-B7A5EBFD46D1}" type="datetimeFigureOut">
               <a:rPr lang="de-DE" smtClean="0"/>
-              <a:t>16.07.24</a:t>
+              <a:t>18.07.24</a:t>
             </a:fld>
             <a:endParaRPr lang="de-DE"/>
           </a:p>
@@ -615,7 +616,7 @@
           <a:p>
             <a:fld id="{68E54768-666B-7949-B767-B7A5EBFD46D1}" type="datetimeFigureOut">
               <a:rPr lang="de-DE" smtClean="0"/>
-              <a:t>16.07.24</a:t>
+              <a:t>18.07.24</a:t>
             </a:fld>
             <a:endParaRPr lang="de-DE"/>
           </a:p>
@@ -788,7 +789,7 @@
           <a:p>
             <a:fld id="{68E54768-666B-7949-B767-B7A5EBFD46D1}" type="datetimeFigureOut">
               <a:rPr lang="de-DE" smtClean="0"/>
-              <a:t>16.07.24</a:t>
+              <a:t>18.07.24</a:t>
             </a:fld>
             <a:endParaRPr lang="de-DE"/>
           </a:p>
@@ -1066,7 +1067,7 @@
           <a:p>
             <a:fld id="{68E54768-666B-7949-B767-B7A5EBFD46D1}" type="datetimeFigureOut">
               <a:rPr lang="de-DE" smtClean="0"/>
-              <a:t>16.07.24</a:t>
+              <a:t>18.07.24</a:t>
             </a:fld>
             <a:endParaRPr lang="de-DE"/>
           </a:p>
@@ -1281,7 +1282,7 @@
           <a:p>
             <a:fld id="{68E54768-666B-7949-B767-B7A5EBFD46D1}" type="datetimeFigureOut">
               <a:rPr lang="de-DE" smtClean="0"/>
-              <a:t>16.07.24</a:t>
+              <a:t>18.07.24</a:t>
             </a:fld>
             <a:endParaRPr lang="de-DE"/>
           </a:p>
@@ -1649,7 +1650,7 @@
           <a:p>
             <a:fld id="{68E54768-666B-7949-B767-B7A5EBFD46D1}" type="datetimeFigureOut">
               <a:rPr lang="de-DE" smtClean="0"/>
-              <a:t>16.07.24</a:t>
+              <a:t>18.07.24</a:t>
             </a:fld>
             <a:endParaRPr lang="de-DE"/>
           </a:p>
@@ -1790,7 +1791,7 @@
           <a:p>
             <a:fld id="{68E54768-666B-7949-B767-B7A5EBFD46D1}" type="datetimeFigureOut">
               <a:rPr lang="de-DE" smtClean="0"/>
-              <a:t>16.07.24</a:t>
+              <a:t>18.07.24</a:t>
             </a:fld>
             <a:endParaRPr lang="de-DE"/>
           </a:p>
@@ -1903,7 +1904,7 @@
           <a:p>
             <a:fld id="{68E54768-666B-7949-B767-B7A5EBFD46D1}" type="datetimeFigureOut">
               <a:rPr lang="de-DE" smtClean="0"/>
-              <a:t>16.07.24</a:t>
+              <a:t>18.07.24</a:t>
             </a:fld>
             <a:endParaRPr lang="de-DE"/>
           </a:p>
@@ -2192,7 +2193,7 @@
           <a:p>
             <a:fld id="{68E54768-666B-7949-B767-B7A5EBFD46D1}" type="datetimeFigureOut">
               <a:rPr lang="de-DE" smtClean="0"/>
-              <a:t>16.07.24</a:t>
+              <a:t>18.07.24</a:t>
             </a:fld>
             <a:endParaRPr lang="de-DE"/>
           </a:p>
@@ -2483,7 +2484,7 @@
           <a:p>
             <a:fld id="{68E54768-666B-7949-B767-B7A5EBFD46D1}" type="datetimeFigureOut">
               <a:rPr lang="de-DE" smtClean="0"/>
-              <a:t>16.07.24</a:t>
+              <a:t>18.07.24</a:t>
             </a:fld>
             <a:endParaRPr lang="de-DE"/>
           </a:p>
@@ -2699,7 +2700,7 @@
           <a:p>
             <a:fld id="{68E54768-666B-7949-B767-B7A5EBFD46D1}" type="datetimeFigureOut">
               <a:rPr lang="de-DE" smtClean="0"/>
-              <a:t>16.07.24</a:t>
+              <a:t>18.07.24</a:t>
             </a:fld>
             <a:endParaRPr lang="de-DE"/>
           </a:p>
@@ -4061,8 +4062,8 @@
         </p:nvSpPr>
         <p:spPr>
           <a:xfrm>
-            <a:off x="8217953" y="2402996"/>
-            <a:ext cx="2472748" cy="1000274"/>
+            <a:off x="7997613" y="2898758"/>
+            <a:ext cx="1047233" cy="507831"/>
           </a:xfrm>
           <a:prstGeom prst="rect">
             <a:avLst/>
@@ -4075,13 +4076,15 @@
           </a:bodyPr>
           <a:lstStyle/>
           <a:p>
-            <a:r>
-              <a:rPr lang="de-DE" sz="1600" dirty="0"/>
-              <a:t>Funktionierende Webseite, die alle gesetzten Anforderungen erfüllt</a:t>
-            </a:r>
-            <a:endParaRPr lang="de-DE" dirty="0"/>
-          </a:p>
-          <a:p>
+            <a:pPr algn="ctr"/>
+            <a:r>
+              <a:rPr lang="de-DE" sz="1600" b="1" dirty="0"/>
+              <a:t>M4</a:t>
+            </a:r>
+            <a:endParaRPr lang="de-DE" b="1" dirty="0"/>
+          </a:p>
+          <a:p>
+            <a:pPr algn="ctr"/>
             <a:r>
               <a:rPr lang="de-DE" sz="1100" dirty="0"/>
               <a:t>(07.07.)</a:t>
@@ -4155,8 +4158,8 @@
         </p:nvSpPr>
         <p:spPr>
           <a:xfrm>
-            <a:off x="4659092" y="1286184"/>
-            <a:ext cx="3191631" cy="1246495"/>
+            <a:off x="3370118" y="2013299"/>
+            <a:ext cx="3191631" cy="507831"/>
           </a:xfrm>
           <a:prstGeom prst="rect">
             <a:avLst/>
@@ -4169,16 +4172,14 @@
           </a:bodyPr>
           <a:lstStyle/>
           <a:p>
-            <a:r>
-              <a:rPr lang="de-DE" sz="1600" dirty="0"/>
-              <a:t>Fertige Architekturplanung + Festlegung des Funktionsumfangs der Anwendung, </a:t>
-            </a:r>
+            <a:pPr algn="ctr"/>
             <a:r>
               <a:rPr lang="de-DE" sz="1600" b="1" dirty="0"/>
-              <a:t>Entwicklungsbeginn</a:t>
-            </a:r>
-          </a:p>
-          <a:p>
+              <a:t>M3</a:t>
+            </a:r>
+          </a:p>
+          <a:p>
+            <a:pPr algn="ctr"/>
             <a:r>
               <a:rPr lang="de-DE" sz="1100" dirty="0"/>
               <a:t>(09.06.)</a:t>
@@ -4252,8 +4253,8 @@
         </p:nvSpPr>
         <p:spPr>
           <a:xfrm>
-            <a:off x="8837866" y="3566738"/>
-            <a:ext cx="1769896" cy="754053"/>
+            <a:off x="8595494" y="3831146"/>
+            <a:ext cx="1132399" cy="507831"/>
           </a:xfrm>
           <a:prstGeom prst="rect">
             <a:avLst/>
@@ -4266,12 +4267,14 @@
           </a:bodyPr>
           <a:lstStyle/>
           <a:p>
-            <a:r>
-              <a:rPr lang="de-DE" sz="1600" dirty="0"/>
-              <a:t>Fertigstellung des Projekts</a:t>
-            </a:r>
-          </a:p>
-          <a:p>
+            <a:pPr algn="ctr"/>
+            <a:r>
+              <a:rPr lang="de-DE" sz="1600" b="1" dirty="0"/>
+              <a:t>M5</a:t>
+            </a:r>
+          </a:p>
+          <a:p>
+            <a:pPr algn="ctr"/>
             <a:r>
               <a:rPr lang="de-DE" sz="1100" dirty="0"/>
               <a:t>(15.07.)</a:t>
@@ -4450,8 +4453,8 @@
         </p:nvSpPr>
         <p:spPr>
           <a:xfrm>
-            <a:off x="9870578" y="4437782"/>
-            <a:ext cx="1628403" cy="754053"/>
+            <a:off x="9870578" y="4680156"/>
+            <a:ext cx="1628403" cy="507831"/>
           </a:xfrm>
           <a:prstGeom prst="rect">
             <a:avLst/>
@@ -4466,10 +4469,10 @@
           <a:p>
             <a:pPr algn="ctr"/>
             <a:r>
-              <a:rPr lang="de-DE" sz="1600" dirty="0"/>
-              <a:t>Abgabe Projekt + Projekthandbuch</a:t>
-            </a:r>
-            <a:endParaRPr lang="de-DE" dirty="0"/>
+              <a:rPr lang="de-DE" sz="1600" b="1" dirty="0"/>
+              <a:t>M6</a:t>
+            </a:r>
+            <a:endParaRPr lang="de-DE" b="1" dirty="0"/>
           </a:p>
           <a:p>
             <a:pPr algn="ctr"/>
@@ -4546,7 +4549,7 @@
         </p:nvSpPr>
         <p:spPr>
           <a:xfrm>
-            <a:off x="1069917" y="1111768"/>
+            <a:off x="1003815" y="1111768"/>
             <a:ext cx="764651" cy="507831"/>
           </a:xfrm>
           <a:prstGeom prst="rect">
@@ -4560,13 +4563,15 @@
           </a:bodyPr>
           <a:lstStyle/>
           <a:p>
-            <a:r>
-              <a:rPr lang="de-DE" sz="1600" dirty="0"/>
-              <a:t>Start</a:t>
-            </a:r>
-            <a:endParaRPr lang="de-DE" dirty="0"/>
-          </a:p>
-          <a:p>
+            <a:pPr algn="ctr"/>
+            <a:r>
+              <a:rPr lang="de-DE" sz="1600" b="1" dirty="0"/>
+              <a:t>M1</a:t>
+            </a:r>
+            <a:endParaRPr lang="de-DE" b="1" dirty="0"/>
+          </a:p>
+          <a:p>
+            <a:pPr algn="ctr"/>
             <a:r>
               <a:rPr lang="de-DE" sz="1100" dirty="0"/>
               <a:t>(15.05.)</a:t>
@@ -4640,8 +4645,8 @@
         </p:nvSpPr>
         <p:spPr>
           <a:xfrm>
-            <a:off x="2480997" y="842185"/>
-            <a:ext cx="1493602" cy="754053"/>
+            <a:off x="2414895" y="1084558"/>
+            <a:ext cx="764651" cy="507831"/>
           </a:xfrm>
           <a:prstGeom prst="rect">
             <a:avLst/>
@@ -4654,12 +4659,14 @@
           </a:bodyPr>
           <a:lstStyle/>
           <a:p>
-            <a:r>
-              <a:rPr lang="de-DE" sz="1600" dirty="0"/>
-              <a:t>Festlegung Ziele</a:t>
-            </a:r>
-          </a:p>
-          <a:p>
+            <a:pPr algn="ctr"/>
+            <a:r>
+              <a:rPr lang="de-DE" sz="1600" b="1" dirty="0"/>
+              <a:t>M2</a:t>
+            </a:r>
+          </a:p>
+          <a:p>
+            <a:pPr algn="ctr"/>
             <a:r>
               <a:rPr lang="de-DE" sz="1100" dirty="0"/>
               <a:t>(24.05.)</a:t>
@@ -4781,8 +4788,8 @@
         </p:nvSpPr>
         <p:spPr>
           <a:xfrm>
-            <a:off x="10679816" y="5180320"/>
-            <a:ext cx="1638331" cy="754053"/>
+            <a:off x="11010324" y="5433710"/>
+            <a:ext cx="968779" cy="507831"/>
           </a:xfrm>
           <a:prstGeom prst="rect">
             <a:avLst/>
@@ -4797,8 +4804,8 @@
           <a:p>
             <a:pPr algn="ctr"/>
             <a:r>
-              <a:rPr lang="de-DE" sz="1600" dirty="0"/>
-              <a:t>Projektabschluss-feier </a:t>
+              <a:rPr lang="de-DE" sz="1600" b="1" dirty="0"/>
+              <a:t>M7</a:t>
             </a:r>
             <a:br>
               <a:rPr lang="de-DE" sz="1600" dirty="0"/>
@@ -4814,6 +4821,196 @@
     <p:extLst>
       <p:ext uri="{BB962C8B-B14F-4D97-AF65-F5344CB8AC3E}">
         <p14:creationId xmlns:p14="http://schemas.microsoft.com/office/powerpoint/2010/main" val="4284873759"/>
+      </p:ext>
+    </p:extLst>
+  </p:cSld>
+  <p:clrMapOvr>
+    <a:masterClrMapping/>
+  </p:clrMapOvr>
+</p:sld>
+</file>
+
+<file path=ppt/slides/slide2.xml><?xml version="1.0" encoding="utf-8"?>
+<p:sld xmlns:a="http://schemas.openxmlformats.org/drawingml/2006/main" xmlns:r="http://schemas.openxmlformats.org/officeDocument/2006/relationships" xmlns:p="http://schemas.openxmlformats.org/presentationml/2006/main">
+  <p:cSld>
+    <p:spTree>
+      <p:nvGrpSpPr>
+        <p:cNvPr id="1" name=""/>
+        <p:cNvGrpSpPr/>
+        <p:nvPr/>
+      </p:nvGrpSpPr>
+      <p:grpSpPr>
+        <a:xfrm>
+          <a:off x="0" y="0"/>
+          <a:ext cx="0" cy="0"/>
+          <a:chOff x="0" y="0"/>
+          <a:chExt cx="0" cy="0"/>
+        </a:xfrm>
+      </p:grpSpPr>
+      <p:sp>
+        <p:nvSpPr>
+          <p:cNvPr id="3" name="Content Placeholder 2">
+            <a:extLst>
+              <a:ext uri="{FF2B5EF4-FFF2-40B4-BE49-F238E27FC236}">
+                <a16:creationId xmlns:a16="http://schemas.microsoft.com/office/drawing/2014/main" id="{AC26CCB5-AC0B-AD1A-B0C2-70A8CA35C3D8}"/>
+              </a:ext>
+            </a:extLst>
+          </p:cNvPr>
+          <p:cNvSpPr>
+            <a:spLocks noGrp="1"/>
+          </p:cNvSpPr>
+          <p:nvPr>
+            <p:ph idx="1"/>
+          </p:nvPr>
+        </p:nvSpPr>
+        <p:spPr>
+          <a:xfrm>
+            <a:off x="838200" y="797718"/>
+            <a:ext cx="10515600" cy="5262563"/>
+          </a:xfrm>
+        </p:spPr>
+        <p:txBody>
+          <a:bodyPr/>
+          <a:lstStyle/>
+          <a:p>
+            <a:pPr marL="0" indent="0">
+              <a:buNone/>
+            </a:pPr>
+            <a:r>
+              <a:rPr lang="en-US" b="1" dirty="0"/>
+              <a:t>M1</a:t>
+            </a:r>
+            <a:r>
+              <a:rPr lang="en-US" dirty="0"/>
+              <a:t>:	Start</a:t>
+            </a:r>
+          </a:p>
+          <a:p>
+            <a:pPr marL="0" indent="0">
+              <a:buNone/>
+            </a:pPr>
+            <a:r>
+              <a:rPr lang="en-US" b="1" dirty="0"/>
+              <a:t>M2</a:t>
+            </a:r>
+            <a:r>
+              <a:rPr lang="en-US" dirty="0"/>
+              <a:t>:	</a:t>
+            </a:r>
+            <a:r>
+              <a:rPr lang="en-US" dirty="0" err="1"/>
+              <a:t>Festlegung</a:t>
+            </a:r>
+            <a:r>
+              <a:rPr lang="en-US" dirty="0"/>
+              <a:t> </a:t>
+            </a:r>
+            <a:r>
+              <a:rPr lang="en-US" dirty="0" err="1"/>
+              <a:t>Ziele</a:t>
+            </a:r>
+            <a:endParaRPr lang="en-US" dirty="0"/>
+          </a:p>
+          <a:p>
+            <a:pPr marL="0" indent="0">
+              <a:buNone/>
+            </a:pPr>
+            <a:r>
+              <a:rPr lang="en-US" b="1" dirty="0"/>
+              <a:t>M3</a:t>
+            </a:r>
+            <a:r>
+              <a:rPr lang="en-US" dirty="0"/>
+              <a:t>:	</a:t>
+            </a:r>
+            <a:r>
+              <a:rPr lang="de-DE" sz="2800" dirty="0"/>
+              <a:t>Fertige Architekturplanung + Festlegung des Funktionsumfangs 	der Anwendung, </a:t>
+            </a:r>
+            <a:r>
+              <a:rPr lang="de-DE" sz="2800" u="sng" dirty="0"/>
+              <a:t>Entwicklungsbeginn</a:t>
+            </a:r>
+            <a:endParaRPr lang="en-US" u="sng" dirty="0"/>
+          </a:p>
+          <a:p>
+            <a:pPr marL="0" indent="0">
+              <a:buNone/>
+            </a:pPr>
+            <a:r>
+              <a:rPr lang="en-US" b="1" dirty="0"/>
+              <a:t>M4</a:t>
+            </a:r>
+            <a:r>
+              <a:rPr lang="en-US" dirty="0"/>
+              <a:t>:	</a:t>
+            </a:r>
+            <a:r>
+              <a:rPr lang="de-DE" sz="2800" dirty="0"/>
+              <a:t>Funktionierende Webseite, die alle gesetzten Anforderungen 	erfüllt</a:t>
+            </a:r>
+            <a:endParaRPr lang="en-US" dirty="0"/>
+          </a:p>
+          <a:p>
+            <a:pPr marL="0" indent="0">
+              <a:buNone/>
+            </a:pPr>
+            <a:r>
+              <a:rPr lang="en-US" b="1" dirty="0"/>
+              <a:t>M5</a:t>
+            </a:r>
+            <a:r>
+              <a:rPr lang="en-US" dirty="0"/>
+              <a:t>:	</a:t>
+            </a:r>
+            <a:r>
+              <a:rPr lang="de-DE" sz="2800" dirty="0"/>
+              <a:t>Fertigstellung des Projekts</a:t>
+            </a:r>
+            <a:endParaRPr lang="en-US" dirty="0"/>
+          </a:p>
+          <a:p>
+            <a:pPr marL="0" indent="0">
+              <a:buNone/>
+            </a:pPr>
+            <a:r>
+              <a:rPr lang="en-US" b="1" dirty="0"/>
+              <a:t>M6</a:t>
+            </a:r>
+            <a:r>
+              <a:rPr lang="en-US" dirty="0"/>
+              <a:t>:	</a:t>
+            </a:r>
+            <a:r>
+              <a:rPr lang="de-DE" sz="2800" dirty="0"/>
+              <a:t>Abgabe Projekt + Projekthandbuch</a:t>
+            </a:r>
+            <a:endParaRPr lang="en-US" dirty="0"/>
+          </a:p>
+          <a:p>
+            <a:pPr marL="0" indent="0">
+              <a:buNone/>
+            </a:pPr>
+            <a:r>
+              <a:rPr lang="en-US" b="1" dirty="0"/>
+              <a:t>M7</a:t>
+            </a:r>
+            <a:r>
+              <a:rPr lang="en-US" dirty="0"/>
+              <a:t>:	</a:t>
+            </a:r>
+            <a:r>
+              <a:rPr lang="de-DE" sz="2800" dirty="0"/>
+              <a:t>Projektabschlussfeier</a:t>
+            </a:r>
+            <a:endParaRPr lang="en-US" dirty="0"/>
+          </a:p>
+        </p:txBody>
+      </p:sp>
+    </p:spTree>
+    <p:extLst>
+      <p:ext uri="{BB962C8B-B14F-4D97-AF65-F5344CB8AC3E}">
+        <p14:creationId xmlns:p14="http://schemas.microsoft.com/office/powerpoint/2010/main" val="1411255843"/>
       </p:ext>
     </p:extLst>
   </p:cSld>

</xml_diff>